<commit_message>
Updated images, SQL files, and Power BI report; resolved file issues
</commit_message>
<xml_diff>
--- a/Marketing Analytics Business Case.pptx
+++ b/Marketing Analytics Business Case.pptx
@@ -4,14 +4,17 @@
   <p:sldMasterIdLst>
     <p:sldMasterId id="2147483648" r:id="rId1"/>
   </p:sldMasterIdLst>
+  <p:notesMasterIdLst>
+    <p:notesMasterId r:id="rId6"/>
+  </p:notesMasterIdLst>
   <p:sldIdLst>
     <p:sldId id="256" r:id="rId3"/>
     <p:sldId id="258" r:id="rId4"/>
-    <p:sldId id="259" r:id="rId5"/>
-    <p:sldId id="260" r:id="rId6"/>
-    <p:sldId id="261" r:id="rId7"/>
-    <p:sldId id="262" r:id="rId8"/>
-    <p:sldId id="263" r:id="rId9"/>
+    <p:sldId id="264" r:id="rId5"/>
+    <p:sldId id="260" r:id="rId7"/>
+    <p:sldId id="261" r:id="rId8"/>
+    <p:sldId id="262" r:id="rId9"/>
+    <p:sldId id="263" r:id="rId10"/>
   </p:sldIdLst>
   <p:sldSz cx="12192000" cy="6858000"/>
   <p:notesSz cx="6858000" cy="9144000"/>
@@ -111,6 +114,401 @@
     </a:lvl9pPr>
   </p:defaultTextStyle>
 </p:presentation>
+</file>
+
+<file path=ppt/notesMasters/notesMaster1.xml><?xml version="1.0" encoding="utf-8"?>
+<p:notesMaster xmlns:a="http://schemas.openxmlformats.org/drawingml/2006/main" xmlns:r="http://schemas.openxmlformats.org/officeDocument/2006/relationships" xmlns:p="http://schemas.openxmlformats.org/presentationml/2006/main">
+  <p:cSld>
+    <p:bg>
+      <p:bgRef idx="1001">
+        <a:schemeClr val="bg1"/>
+      </p:bgRef>
+    </p:bg>
+    <p:spTree>
+      <p:nvGrpSpPr>
+        <p:cNvPr id="1" name=""/>
+        <p:cNvGrpSpPr/>
+        <p:nvPr/>
+      </p:nvGrpSpPr>
+      <p:grpSpPr>
+        <a:xfrm>
+          <a:off x="0" y="0"/>
+          <a:ext cx="0" cy="0"/>
+          <a:chOff x="0" y="0"/>
+          <a:chExt cx="0" cy="0"/>
+        </a:xfrm>
+      </p:grpSpPr>
+      <p:sp>
+        <p:nvSpPr>
+          <p:cNvPr id="2" name="Header Placeholder 1"/>
+          <p:cNvSpPr>
+            <a:spLocks noGrp="1"/>
+          </p:cNvSpPr>
+          <p:nvPr>
+            <p:ph type="hdr" sz="quarter"/>
+          </p:nvPr>
+        </p:nvSpPr>
+        <p:spPr>
+          <a:xfrm>
+            <a:off x="0" y="0"/>
+            <a:ext cx="2971800" cy="458788"/>
+          </a:xfrm>
+          <a:prstGeom prst="rect">
+            <a:avLst/>
+          </a:prstGeom>
+        </p:spPr>
+        <p:txBody>
+          <a:bodyPr vert="horz" lIns="91440" tIns="45720" rIns="91440" bIns="45720" rtlCol="0"/>
+          <a:lstStyle>
+            <a:lvl1pPr algn="l">
+              <a:defRPr sz="1200"/>
+            </a:lvl1pPr>
+          </a:lstStyle>
+          <a:p>
+            <a:endParaRPr lang="en-US"/>
+          </a:p>
+        </p:txBody>
+      </p:sp>
+      <p:sp>
+        <p:nvSpPr>
+          <p:cNvPr id="3" name="Date Placeholder 2"/>
+          <p:cNvSpPr>
+            <a:spLocks noGrp="1"/>
+          </p:cNvSpPr>
+          <p:nvPr>
+            <p:ph type="dt" idx="1"/>
+          </p:nvPr>
+        </p:nvSpPr>
+        <p:spPr>
+          <a:xfrm>
+            <a:off x="3884613" y="0"/>
+            <a:ext cx="2971800" cy="458788"/>
+          </a:xfrm>
+          <a:prstGeom prst="rect">
+            <a:avLst/>
+          </a:prstGeom>
+        </p:spPr>
+        <p:txBody>
+          <a:bodyPr vert="horz" lIns="91440" tIns="45720" rIns="91440" bIns="45720" rtlCol="0"/>
+          <a:lstStyle>
+            <a:lvl1pPr algn="r">
+              <a:defRPr sz="1200"/>
+            </a:lvl1pPr>
+          </a:lstStyle>
+          <a:p>
+            <a:fld id="{3EFD42F7-718C-4B98-AAEC-167E6DDD60A7}" type="datetimeFigureOut">
+              <a:rPr lang="en-US" smtClean="0"/>
+            </a:fld>
+            <a:endParaRPr lang="en-US"/>
+          </a:p>
+        </p:txBody>
+      </p:sp>
+      <p:sp>
+        <p:nvSpPr>
+          <p:cNvPr id="4" name="Slide Image Placeholder 3"/>
+          <p:cNvSpPr>
+            <a:spLocks noGrp="1" noRot="1" noChangeAspect="1"/>
+          </p:cNvSpPr>
+          <p:nvPr>
+            <p:ph type="sldImg" idx="2"/>
+          </p:nvPr>
+        </p:nvSpPr>
+        <p:spPr>
+          <a:xfrm>
+            <a:off x="685800" y="1143000"/>
+            <a:ext cx="5486400" cy="3086100"/>
+          </a:xfrm>
+          <a:prstGeom prst="rect">
+            <a:avLst/>
+          </a:prstGeom>
+          <a:noFill/>
+          <a:ln w="12700">
+            <a:solidFill>
+              <a:prstClr val="black"/>
+            </a:solidFill>
+          </a:ln>
+        </p:spPr>
+        <p:txBody>
+          <a:bodyPr vert="horz" lIns="91440" tIns="45720" rIns="91440" bIns="45720" rtlCol="0" anchor="ctr"/>
+          <a:lstStyle/>
+          <a:p>
+            <a:endParaRPr lang="en-US"/>
+          </a:p>
+        </p:txBody>
+      </p:sp>
+      <p:sp>
+        <p:nvSpPr>
+          <p:cNvPr id="5" name="Notes Placeholder 4"/>
+          <p:cNvSpPr>
+            <a:spLocks noGrp="1"/>
+          </p:cNvSpPr>
+          <p:nvPr>
+            <p:ph type="body" sz="quarter" idx="3"/>
+          </p:nvPr>
+        </p:nvSpPr>
+        <p:spPr>
+          <a:xfrm>
+            <a:off x="685800" y="4400550"/>
+            <a:ext cx="5486400" cy="3600450"/>
+          </a:xfrm>
+          <a:prstGeom prst="rect">
+            <a:avLst/>
+          </a:prstGeom>
+        </p:spPr>
+        <p:txBody>
+          <a:bodyPr vert="horz" lIns="91440" tIns="45720" rIns="91440" bIns="45720" rtlCol="0"/>
+          <a:lstStyle/>
+          <a:p>
+            <a:pPr lvl="0"/>
+            <a:r>
+              <a:rPr lang="en-US" smtClean="0"/>
+              <a:t>Click to edit Master text styles</a:t>
+            </a:r>
+            <a:endParaRPr lang="en-US" smtClean="0"/>
+          </a:p>
+          <a:p>
+            <a:pPr lvl="1"/>
+            <a:r>
+              <a:rPr lang="en-US" smtClean="0"/>
+              <a:t>Second level</a:t>
+            </a:r>
+            <a:endParaRPr lang="en-US" smtClean="0"/>
+          </a:p>
+          <a:p>
+            <a:pPr lvl="2"/>
+            <a:r>
+              <a:rPr lang="en-US" smtClean="0"/>
+              <a:t>Third level</a:t>
+            </a:r>
+            <a:endParaRPr lang="en-US" smtClean="0"/>
+          </a:p>
+          <a:p>
+            <a:pPr lvl="3"/>
+            <a:r>
+              <a:rPr lang="en-US" smtClean="0"/>
+              <a:t>Fourth level</a:t>
+            </a:r>
+            <a:endParaRPr lang="en-US" smtClean="0"/>
+          </a:p>
+          <a:p>
+            <a:pPr lvl="4"/>
+            <a:r>
+              <a:rPr lang="en-US" smtClean="0"/>
+              <a:t>Fifth level</a:t>
+            </a:r>
+            <a:endParaRPr lang="en-US"/>
+          </a:p>
+        </p:txBody>
+      </p:sp>
+      <p:sp>
+        <p:nvSpPr>
+          <p:cNvPr id="6" name="Footer Placeholder 5"/>
+          <p:cNvSpPr>
+            <a:spLocks noGrp="1"/>
+          </p:cNvSpPr>
+          <p:nvPr>
+            <p:ph type="ftr" sz="quarter" idx="4"/>
+          </p:nvPr>
+        </p:nvSpPr>
+        <p:spPr>
+          <a:xfrm>
+            <a:off x="0" y="8685213"/>
+            <a:ext cx="2971800" cy="458787"/>
+          </a:xfrm>
+          <a:prstGeom prst="rect">
+            <a:avLst/>
+          </a:prstGeom>
+        </p:spPr>
+        <p:txBody>
+          <a:bodyPr vert="horz" lIns="91440" tIns="45720" rIns="91440" bIns="45720" rtlCol="0" anchor="b"/>
+          <a:lstStyle>
+            <a:lvl1pPr algn="l">
+              <a:defRPr sz="1200"/>
+            </a:lvl1pPr>
+          </a:lstStyle>
+          <a:p>
+            <a:endParaRPr lang="en-US"/>
+          </a:p>
+        </p:txBody>
+      </p:sp>
+      <p:sp>
+        <p:nvSpPr>
+          <p:cNvPr id="7" name="Slide Number Placeholder 6"/>
+          <p:cNvSpPr>
+            <a:spLocks noGrp="1"/>
+          </p:cNvSpPr>
+          <p:nvPr>
+            <p:ph type="sldNum" sz="quarter" idx="5"/>
+          </p:nvPr>
+        </p:nvSpPr>
+        <p:spPr>
+          <a:xfrm>
+            <a:off x="3884613" y="8685213"/>
+            <a:ext cx="2971800" cy="458787"/>
+          </a:xfrm>
+          <a:prstGeom prst="rect">
+            <a:avLst/>
+          </a:prstGeom>
+        </p:spPr>
+        <p:txBody>
+          <a:bodyPr vert="horz" lIns="91440" tIns="45720" rIns="91440" bIns="45720" rtlCol="0" anchor="b"/>
+          <a:lstStyle>
+            <a:lvl1pPr algn="r">
+              <a:defRPr sz="1200"/>
+            </a:lvl1pPr>
+          </a:lstStyle>
+          <a:p>
+            <a:fld id="{21B2AA4F-B828-4D7C-AFD3-893933DAFCB4}" type="slidenum">
+              <a:rPr lang="en-US" smtClean="0"/>
+            </a:fld>
+            <a:endParaRPr lang="en-US"/>
+          </a:p>
+        </p:txBody>
+      </p:sp>
+    </p:spTree>
+  </p:cSld>
+  <p:clrMap bg1="lt1" tx1="dk1" bg2="lt2" tx2="dk2" accent1="accent1" accent2="accent2" accent3="accent3" accent4="accent4" accent5="accent5" accent6="accent6" hlink="hlink" folHlink="folHlink"/>
+  <p:notesStyle>
+    <a:lvl1pPr marL="0" algn="l" defTabSz="914400" rtl="0" eaLnBrk="1" latinLnBrk="0" hangingPunct="1">
+      <a:defRPr sz="1200" kern="1200">
+        <a:solidFill>
+          <a:schemeClr val="tx1"/>
+        </a:solidFill>
+        <a:latin typeface="+mn-lt"/>
+        <a:ea typeface="+mn-ea"/>
+        <a:cs typeface="+mn-cs"/>
+      </a:defRPr>
+    </a:lvl1pPr>
+    <a:lvl2pPr marL="457200" algn="l" defTabSz="914400" rtl="0" eaLnBrk="1" latinLnBrk="0" hangingPunct="1">
+      <a:defRPr sz="1200" kern="1200">
+        <a:solidFill>
+          <a:schemeClr val="tx1"/>
+        </a:solidFill>
+        <a:latin typeface="+mn-lt"/>
+        <a:ea typeface="+mn-ea"/>
+        <a:cs typeface="+mn-cs"/>
+      </a:defRPr>
+    </a:lvl2pPr>
+    <a:lvl3pPr marL="914400" algn="l" defTabSz="914400" rtl="0" eaLnBrk="1" latinLnBrk="0" hangingPunct="1">
+      <a:defRPr sz="1200" kern="1200">
+        <a:solidFill>
+          <a:schemeClr val="tx1"/>
+        </a:solidFill>
+        <a:latin typeface="+mn-lt"/>
+        <a:ea typeface="+mn-ea"/>
+        <a:cs typeface="+mn-cs"/>
+      </a:defRPr>
+    </a:lvl3pPr>
+    <a:lvl4pPr marL="1371600" algn="l" defTabSz="914400" rtl="0" eaLnBrk="1" latinLnBrk="0" hangingPunct="1">
+      <a:defRPr sz="1200" kern="1200">
+        <a:solidFill>
+          <a:schemeClr val="tx1"/>
+        </a:solidFill>
+        <a:latin typeface="+mn-lt"/>
+        <a:ea typeface="+mn-ea"/>
+        <a:cs typeface="+mn-cs"/>
+      </a:defRPr>
+    </a:lvl4pPr>
+    <a:lvl5pPr marL="1828800" algn="l" defTabSz="914400" rtl="0" eaLnBrk="1" latinLnBrk="0" hangingPunct="1">
+      <a:defRPr sz="1200" kern="1200">
+        <a:solidFill>
+          <a:schemeClr val="tx1"/>
+        </a:solidFill>
+        <a:latin typeface="+mn-lt"/>
+        <a:ea typeface="+mn-ea"/>
+        <a:cs typeface="+mn-cs"/>
+      </a:defRPr>
+    </a:lvl5pPr>
+    <a:lvl6pPr marL="2286000" algn="l" defTabSz="914400" rtl="0" eaLnBrk="1" latinLnBrk="0" hangingPunct="1">
+      <a:defRPr sz="1200" kern="1200">
+        <a:solidFill>
+          <a:schemeClr val="tx1"/>
+        </a:solidFill>
+        <a:latin typeface="+mn-lt"/>
+        <a:ea typeface="+mn-ea"/>
+        <a:cs typeface="+mn-cs"/>
+      </a:defRPr>
+    </a:lvl6pPr>
+    <a:lvl7pPr marL="2743200" algn="l" defTabSz="914400" rtl="0" eaLnBrk="1" latinLnBrk="0" hangingPunct="1">
+      <a:defRPr sz="1200" kern="1200">
+        <a:solidFill>
+          <a:schemeClr val="tx1"/>
+        </a:solidFill>
+        <a:latin typeface="+mn-lt"/>
+        <a:ea typeface="+mn-ea"/>
+        <a:cs typeface="+mn-cs"/>
+      </a:defRPr>
+    </a:lvl7pPr>
+    <a:lvl8pPr marL="3200400" algn="l" defTabSz="914400" rtl="0" eaLnBrk="1" latinLnBrk="0" hangingPunct="1">
+      <a:defRPr sz="1200" kern="1200">
+        <a:solidFill>
+          <a:schemeClr val="tx1"/>
+        </a:solidFill>
+        <a:latin typeface="+mn-lt"/>
+        <a:ea typeface="+mn-ea"/>
+        <a:cs typeface="+mn-cs"/>
+      </a:defRPr>
+    </a:lvl8pPr>
+    <a:lvl9pPr marL="3657600" algn="l" defTabSz="914400" rtl="0" eaLnBrk="1" latinLnBrk="0" hangingPunct="1">
+      <a:defRPr sz="1200" kern="1200">
+        <a:solidFill>
+          <a:schemeClr val="tx1"/>
+        </a:solidFill>
+        <a:latin typeface="+mn-lt"/>
+        <a:ea typeface="+mn-ea"/>
+        <a:cs typeface="+mn-cs"/>
+      </a:defRPr>
+    </a:lvl9pPr>
+  </p:notesStyle>
+</p:notesMaster>
+</file>
+
+<file path=ppt/notesSlides/notesSlide1.xml><?xml version="1.0" encoding="utf-8"?>
+<p:notes xmlns:a="http://schemas.openxmlformats.org/drawingml/2006/main" xmlns:r="http://schemas.openxmlformats.org/officeDocument/2006/relationships" xmlns:p="http://schemas.openxmlformats.org/presentationml/2006/main">
+  <p:cSld>
+    <p:spTree>
+      <p:nvGrpSpPr>
+        <p:cNvPr id="1" name=""/>
+        <p:cNvGrpSpPr/>
+        <p:nvPr/>
+      </p:nvGrpSpPr>
+      <p:grpSpPr/>
+      <p:sp>
+        <p:nvSpPr>
+          <p:cNvPr id="2" name="Slide Image Placeholder 1"/>
+          <p:cNvSpPr>
+            <a:spLocks noGrp="1"/>
+          </p:cNvSpPr>
+          <p:nvPr>
+            <p:ph type="sldImg" idx="2"/>
+          </p:nvPr>
+        </p:nvSpPr>
+        <p:spPr/>
+      </p:sp>
+      <p:sp>
+        <p:nvSpPr>
+          <p:cNvPr id="3" name="Text Placeholder 2"/>
+          <p:cNvSpPr>
+            <a:spLocks noGrp="1"/>
+          </p:cNvSpPr>
+          <p:nvPr>
+            <p:ph type="body" idx="3"/>
+          </p:nvPr>
+        </p:nvSpPr>
+        <p:spPr/>
+        <p:txBody>
+          <a:bodyPr/>
+          <a:p>
+            <a:endParaRPr lang="en-US"/>
+          </a:p>
+        </p:txBody>
+      </p:sp>
+    </p:spTree>
+  </p:cSld>
+  <p:clrMapOvr>
+    <a:masterClrMapping/>
+  </p:clrMapOvr>
+</p:notes>
 </file>
 
 <file path=ppt/slideLayouts/slideLayout1.xml><?xml version="1.0" encoding="utf-8"?>
@@ -3197,7 +3595,7 @@
       </p:grpSpPr>
       <p:pic>
         <p:nvPicPr>
-          <p:cNvPr id="3" name="Picture 2"/>
+          <p:cNvPr id="5" name="Picture 4" descr="Overview"/>
           <p:cNvPicPr>
             <a:picLocks noChangeAspect="1"/>
           </p:cNvPicPr>
@@ -3205,14 +3603,15 @@
         </p:nvPicPr>
         <p:blipFill>
           <a:blip r:embed="rId1"/>
+          <a:srcRect l="11219" t="7974" r="703" b="730"/>
           <a:stretch>
             <a:fillRect/>
           </a:stretch>
         </p:blipFill>
         <p:spPr>
           <a:xfrm>
-            <a:off x="4482465" y="1691005"/>
-            <a:ext cx="7319010" cy="4290060"/>
+            <a:off x="4565015" y="1769110"/>
+            <a:ext cx="7446010" cy="4326255"/>
           </a:xfrm>
           <a:prstGeom prst="rect">
             <a:avLst/>
@@ -3574,36 +3973,9 @@
           <a:chExt cx="0" cy="0"/>
         </a:xfrm>
       </p:grpSpPr>
-      <p:sp>
-        <p:nvSpPr>
-          <p:cNvPr id="2" name="Title 1"/>
-          <p:cNvSpPr>
-            <a:spLocks noGrp="1"/>
-          </p:cNvSpPr>
-          <p:nvPr>
-            <p:ph type="title"/>
-          </p:nvPr>
-        </p:nvSpPr>
-        <p:spPr/>
-        <p:txBody>
-          <a:bodyPr/>
-          <a:lstStyle/>
-          <a:p>
-            <a:r>
-              <a:rPr lang="nb-NO" dirty="0" err="1"/>
-              <a:t>Decreased</a:t>
-            </a:r>
-            <a:r>
-              <a:rPr lang="nb-NO" dirty="0"/>
-              <a:t> Conversion Rates</a:t>
-            </a:r>
-            <a:endParaRPr lang="nb-NO" dirty="0"/>
-          </a:p>
-        </p:txBody>
-      </p:sp>
       <p:pic>
         <p:nvPicPr>
-          <p:cNvPr id="5" name="Image 4"/>
+          <p:cNvPr id="4" name="Picture 3"/>
           <p:cNvPicPr>
             <a:picLocks noChangeAspect="1"/>
           </p:cNvPicPr>
@@ -3617,14 +3989,41 @@
         </p:blipFill>
         <p:spPr>
           <a:xfrm>
-            <a:off x="5514749" y="2244748"/>
-            <a:ext cx="6158409" cy="3513092"/>
+            <a:off x="5476875" y="2159635"/>
+            <a:ext cx="5988050" cy="3625215"/>
           </a:xfrm>
           <a:prstGeom prst="rect">
             <a:avLst/>
           </a:prstGeom>
         </p:spPr>
       </p:pic>
+      <p:sp>
+        <p:nvSpPr>
+          <p:cNvPr id="2" name="Title 1"/>
+          <p:cNvSpPr>
+            <a:spLocks noGrp="1"/>
+          </p:cNvSpPr>
+          <p:nvPr>
+            <p:ph type="title"/>
+          </p:nvPr>
+        </p:nvSpPr>
+        <p:spPr/>
+        <p:txBody>
+          <a:bodyPr/>
+          <a:lstStyle/>
+          <a:p>
+            <a:r>
+              <a:rPr lang="nb-NO" dirty="0" err="1"/>
+              <a:t>Decreased</a:t>
+            </a:r>
+            <a:r>
+              <a:rPr lang="nb-NO" dirty="0"/>
+              <a:t> Conversion Rates</a:t>
+            </a:r>
+            <a:endParaRPr lang="nb-NO" dirty="0"/>
+          </a:p>
+        </p:txBody>
+      </p:sp>
       <p:sp>
         <p:nvSpPr>
           <p:cNvPr id="3" name="Content Placeholder 2"/>
@@ -3839,122 +4238,9 @@
           <a:chExt cx="0" cy="0"/>
         </a:xfrm>
       </p:grpSpPr>
-      <p:sp>
-        <p:nvSpPr>
-          <p:cNvPr id="2" name="Title 1"/>
-          <p:cNvSpPr>
-            <a:spLocks noGrp="1"/>
-          </p:cNvSpPr>
-          <p:nvPr>
-            <p:ph type="title"/>
-          </p:nvPr>
-        </p:nvSpPr>
-        <p:spPr/>
-        <p:txBody>
-          <a:bodyPr/>
-          <a:lstStyle/>
-          <a:p>
-            <a:r>
-              <a:rPr lang="en-US" dirty="0"/>
-              <a:t>Reduced Customer Engagement</a:t>
-            </a:r>
-            <a:endParaRPr lang="nb-NO" dirty="0"/>
-          </a:p>
-        </p:txBody>
-      </p:sp>
-      <p:sp>
-        <p:nvSpPr>
-          <p:cNvPr id="3" name="Content Placeholder 2"/>
-          <p:cNvSpPr>
-            <a:spLocks noGrp="1"/>
-          </p:cNvSpPr>
-          <p:nvPr>
-            <p:ph sz="half" idx="1"/>
-          </p:nvPr>
-        </p:nvSpPr>
-        <p:spPr/>
-        <p:txBody>
-          <a:bodyPr>
-            <a:normAutofit fontScale="55000" lnSpcReduction="20000"/>
-          </a:bodyPr>
-          <a:lstStyle/>
-          <a:p>
-            <a:pPr>
-              <a:lnSpc>
-                <a:spcPct val="170000"/>
-              </a:lnSpc>
-            </a:pPr>
-            <a:r>
-              <a:rPr lang="en-US" b="1" dirty="0"/>
-              <a:t>Declining Views:</a:t>
-            </a:r>
-            <a:endParaRPr lang="en-US" b="1" dirty="0"/>
-          </a:p>
-          <a:p>
-            <a:pPr lvl="1">
-              <a:lnSpc>
-                <a:spcPct val="170000"/>
-              </a:lnSpc>
-            </a:pPr>
-            <a:r>
-              <a:rPr lang="en-US" dirty="0"/>
-              <a:t>Views peaked in February and July but declined from August and on, indicating reduced audience engagement in the later half of the year.</a:t>
-            </a:r>
-            <a:endParaRPr lang="en-US" dirty="0"/>
-          </a:p>
-          <a:p>
-            <a:pPr>
-              <a:lnSpc>
-                <a:spcPct val="170000"/>
-              </a:lnSpc>
-            </a:pPr>
-            <a:r>
-              <a:rPr lang="en-US" b="1" dirty="0"/>
-              <a:t>Low Interaction Rates:</a:t>
-            </a:r>
-            <a:endParaRPr lang="en-US" b="1" dirty="0"/>
-          </a:p>
-          <a:p>
-            <a:pPr lvl="1">
-              <a:lnSpc>
-                <a:spcPct val="170000"/>
-              </a:lnSpc>
-            </a:pPr>
-            <a:r>
-              <a:rPr lang="en-US" dirty="0"/>
-              <a:t>Clicks and likes remained consistently low compared to views, suggesting the need for more engaging content or stronger calls to action.</a:t>
-            </a:r>
-            <a:endParaRPr lang="en-US" dirty="0"/>
-          </a:p>
-          <a:p>
-            <a:pPr>
-              <a:lnSpc>
-                <a:spcPct val="170000"/>
-              </a:lnSpc>
-            </a:pPr>
-            <a:r>
-              <a:rPr lang="en-US" b="1" dirty="0"/>
-              <a:t>Content Type Performance:</a:t>
-            </a:r>
-            <a:endParaRPr lang="en-US" b="1" dirty="0"/>
-          </a:p>
-          <a:p>
-            <a:pPr lvl="1">
-              <a:lnSpc>
-                <a:spcPct val="170000"/>
-              </a:lnSpc>
-            </a:pPr>
-            <a:r>
-              <a:rPr lang="en-US" dirty="0"/>
-              <a:t>Blog content drove the most views, especially in April and July, while social media and video content maintained steady but slightly lower engagement.</a:t>
-            </a:r>
-            <a:endParaRPr lang="nb-NO" dirty="0"/>
-          </a:p>
-        </p:txBody>
-      </p:sp>
       <p:pic>
         <p:nvPicPr>
-          <p:cNvPr id="14" name="Image 13"/>
+          <p:cNvPr id="5" name="Picture 4"/>
           <p:cNvPicPr>
             <a:picLocks noChangeAspect="1"/>
           </p:cNvPicPr>
@@ -3962,21 +4248,158 @@
         </p:nvPicPr>
         <p:blipFill>
           <a:blip r:embed="rId1"/>
-          <a:srcRect r="50497"/>
+          <a:srcRect l="49456"/>
           <a:stretch>
             <a:fillRect/>
           </a:stretch>
         </p:blipFill>
         <p:spPr>
           <a:xfrm>
-            <a:off x="6488348" y="1503398"/>
-            <a:ext cx="3715101" cy="2411933"/>
+            <a:off x="6395085" y="4147820"/>
+            <a:ext cx="3808095" cy="2345055"/>
           </a:xfrm>
           <a:prstGeom prst="rect">
             <a:avLst/>
           </a:prstGeom>
         </p:spPr>
       </p:pic>
+      <p:pic>
+        <p:nvPicPr>
+          <p:cNvPr id="7" name="Picture 6"/>
+          <p:cNvPicPr>
+            <a:picLocks noChangeAspect="1"/>
+          </p:cNvPicPr>
+          <p:nvPr/>
+        </p:nvPicPr>
+        <p:blipFill>
+          <a:blip r:embed="rId2"/>
+          <a:stretch>
+            <a:fillRect/>
+          </a:stretch>
+        </p:blipFill>
+        <p:spPr>
+          <a:xfrm>
+            <a:off x="6429375" y="1503680"/>
+            <a:ext cx="3773805" cy="2412365"/>
+          </a:xfrm>
+          <a:prstGeom prst="rect">
+            <a:avLst/>
+          </a:prstGeom>
+        </p:spPr>
+      </p:pic>
+      <p:sp>
+        <p:nvSpPr>
+          <p:cNvPr id="2" name="Title 1"/>
+          <p:cNvSpPr>
+            <a:spLocks noGrp="1"/>
+          </p:cNvSpPr>
+          <p:nvPr>
+            <p:ph type="title"/>
+          </p:nvPr>
+        </p:nvSpPr>
+        <p:spPr/>
+        <p:txBody>
+          <a:bodyPr/>
+          <a:lstStyle/>
+          <a:p>
+            <a:r>
+              <a:rPr lang="en-US" dirty="0"/>
+              <a:t>Reduced Customer Engagement</a:t>
+            </a:r>
+            <a:endParaRPr lang="nb-NO" dirty="0"/>
+          </a:p>
+        </p:txBody>
+      </p:sp>
+      <p:sp>
+        <p:nvSpPr>
+          <p:cNvPr id="3" name="Content Placeholder 2"/>
+          <p:cNvSpPr>
+            <a:spLocks noGrp="1"/>
+          </p:cNvSpPr>
+          <p:nvPr>
+            <p:ph sz="half" idx="1"/>
+          </p:nvPr>
+        </p:nvSpPr>
+        <p:spPr/>
+        <p:txBody>
+          <a:bodyPr>
+            <a:normAutofit fontScale="55000" lnSpcReduction="20000"/>
+          </a:bodyPr>
+          <a:lstStyle/>
+          <a:p>
+            <a:pPr>
+              <a:lnSpc>
+                <a:spcPct val="170000"/>
+              </a:lnSpc>
+            </a:pPr>
+            <a:r>
+              <a:rPr lang="en-US" b="1" dirty="0"/>
+              <a:t>Declining Views:</a:t>
+            </a:r>
+            <a:endParaRPr lang="en-US" b="1" dirty="0"/>
+          </a:p>
+          <a:p>
+            <a:pPr lvl="1">
+              <a:lnSpc>
+                <a:spcPct val="170000"/>
+              </a:lnSpc>
+            </a:pPr>
+            <a:r>
+              <a:rPr lang="en-US" dirty="0"/>
+              <a:t>Views peaked in February and July but declined from August and on, indicating reduced audience engagement in the later half of the year.</a:t>
+            </a:r>
+            <a:endParaRPr lang="en-US" dirty="0"/>
+          </a:p>
+          <a:p>
+            <a:pPr>
+              <a:lnSpc>
+                <a:spcPct val="170000"/>
+              </a:lnSpc>
+            </a:pPr>
+            <a:r>
+              <a:rPr lang="en-US" b="1" dirty="0"/>
+              <a:t>Low Interaction Rates:</a:t>
+            </a:r>
+            <a:endParaRPr lang="en-US" b="1" dirty="0"/>
+          </a:p>
+          <a:p>
+            <a:pPr lvl="1">
+              <a:lnSpc>
+                <a:spcPct val="170000"/>
+              </a:lnSpc>
+            </a:pPr>
+            <a:r>
+              <a:rPr lang="en-US" dirty="0"/>
+              <a:t>Clicks and likes remained consistently low compared to views, suggesting the need for more engaging content or stronger calls to action.</a:t>
+            </a:r>
+            <a:endParaRPr lang="en-US" dirty="0"/>
+          </a:p>
+          <a:p>
+            <a:pPr>
+              <a:lnSpc>
+                <a:spcPct val="170000"/>
+              </a:lnSpc>
+            </a:pPr>
+            <a:r>
+              <a:rPr lang="en-US" b="1" dirty="0"/>
+              <a:t>Content Type Performance:</a:t>
+            </a:r>
+            <a:endParaRPr lang="en-US" b="1" dirty="0"/>
+          </a:p>
+          <a:p>
+            <a:pPr lvl="1">
+              <a:lnSpc>
+                <a:spcPct val="170000"/>
+              </a:lnSpc>
+            </a:pPr>
+            <a:r>
+              <a:rPr lang="en-US" dirty="0"/>
+              <a:t>Blog content drove the most views, especially in April and July, while social media and video content maintained steady but slightly lower engagement.</a:t>
+            </a:r>
+            <a:endParaRPr lang="nb-NO" dirty="0"/>
+          </a:p>
+        </p:txBody>
+      </p:sp>
       <p:cxnSp>
         <p:nvCxnSpPr>
           <p:cNvPr id="9" name="Straight Arrow Connector 8"/>
@@ -4016,31 +4439,6 @@
           </a:fontRef>
         </p:style>
       </p:cxnSp>
-      <p:pic>
-        <p:nvPicPr>
-          <p:cNvPr id="16" name="Image 15"/>
-          <p:cNvPicPr>
-            <a:picLocks noChangeAspect="1"/>
-          </p:cNvPicPr>
-          <p:nvPr/>
-        </p:nvPicPr>
-        <p:blipFill>
-          <a:blip r:embed="rId1"/>
-          <a:srcRect l="49075"/>
-          <a:stretch>
-            <a:fillRect/>
-          </a:stretch>
-        </p:blipFill>
-        <p:spPr>
-          <a:xfrm>
-            <a:off x="6488348" y="4148264"/>
-            <a:ext cx="3715101" cy="2344611"/>
-          </a:xfrm>
-          <a:prstGeom prst="rect">
-            <a:avLst/>
-          </a:prstGeom>
-        </p:spPr>
-      </p:pic>
     </p:spTree>
   </p:cSld>
   <p:clrMapOvr>
@@ -4066,126 +4464,9 @@
           <a:chExt cx="0" cy="0"/>
         </a:xfrm>
       </p:grpSpPr>
-      <p:sp>
-        <p:nvSpPr>
-          <p:cNvPr id="2" name="Title 1"/>
-          <p:cNvSpPr>
-            <a:spLocks noGrp="1"/>
-          </p:cNvSpPr>
-          <p:nvPr>
-            <p:ph type="title"/>
-          </p:nvPr>
-        </p:nvSpPr>
-        <p:spPr/>
-        <p:txBody>
-          <a:bodyPr/>
-          <a:lstStyle/>
-          <a:p>
-            <a:r>
-              <a:rPr lang="nb-NO" dirty="0" err="1"/>
-              <a:t>Customer</a:t>
-            </a:r>
-            <a:r>
-              <a:rPr lang="nb-NO" dirty="0"/>
-              <a:t> Feedback Analysis</a:t>
-            </a:r>
-            <a:endParaRPr lang="nb-NO" dirty="0"/>
-          </a:p>
-        </p:txBody>
-      </p:sp>
-      <p:sp>
-        <p:nvSpPr>
-          <p:cNvPr id="3" name="Content Placeholder 2"/>
-          <p:cNvSpPr>
-            <a:spLocks noGrp="1"/>
-          </p:cNvSpPr>
-          <p:nvPr>
-            <p:ph sz="half" idx="1"/>
-          </p:nvPr>
-        </p:nvSpPr>
-        <p:spPr/>
-        <p:txBody>
-          <a:bodyPr>
-            <a:normAutofit fontScale="40000" lnSpcReduction="20000"/>
-          </a:bodyPr>
-          <a:lstStyle/>
-          <a:p>
-            <a:pPr>
-              <a:lnSpc>
-                <a:spcPct val="170000"/>
-              </a:lnSpc>
-            </a:pPr>
-            <a:r>
-              <a:rPr lang="en-US" b="1" dirty="0"/>
-              <a:t>Customer Ratings Distribution:</a:t>
-            </a:r>
-            <a:endParaRPr lang="en-US" b="1" dirty="0"/>
-          </a:p>
-          <a:p>
-            <a:pPr lvl="1">
-              <a:lnSpc>
-                <a:spcPct val="170000"/>
-              </a:lnSpc>
-            </a:pPr>
-            <a:r>
-              <a:rPr lang="en-US" dirty="0"/>
-              <a:t>The majority of customer reviews are in the higher ratings, with 140 reviews at 4 stars and 135 reviews at 5 stars, indicating overall positive feedback. Lower ratings (1-2 stars) account for a smaller proportion, with 26 reviews at 1 star and 57 reviews at 2 stars.</a:t>
-            </a:r>
-            <a:endParaRPr lang="en-US" dirty="0"/>
-          </a:p>
-          <a:p>
-            <a:pPr>
-              <a:lnSpc>
-                <a:spcPct val="170000"/>
-              </a:lnSpc>
-            </a:pPr>
-            <a:r>
-              <a:rPr lang="en-US" b="1" dirty="0"/>
-              <a:t>Sentiment Analysis:</a:t>
-            </a:r>
-            <a:endParaRPr lang="en-US" b="1" dirty="0"/>
-          </a:p>
-          <a:p>
-            <a:pPr lvl="1">
-              <a:lnSpc>
-                <a:spcPct val="170000"/>
-              </a:lnSpc>
-            </a:pPr>
-            <a:r>
-              <a:rPr lang="en-US" dirty="0"/>
-              <a:t>Positive sentiment dominates with 275 reviews, reflecting a generally satisfied customer base. Negative sentiment is present in 82 reviews, with a smaller number of mixed and neutral sentiments, suggesting some areas for improvement but overall strong customer approval.</a:t>
-            </a:r>
-            <a:endParaRPr lang="en-US" dirty="0"/>
-          </a:p>
-          <a:p>
-            <a:pPr>
-              <a:lnSpc>
-                <a:spcPct val="170000"/>
-              </a:lnSpc>
-            </a:pPr>
-            <a:r>
-              <a:rPr lang="en-US" b="1" dirty="0"/>
-              <a:t>Opportunity for Improvement:</a:t>
-            </a:r>
-            <a:endParaRPr lang="en-US" b="1" dirty="0"/>
-          </a:p>
-          <a:p>
-            <a:pPr lvl="1">
-              <a:lnSpc>
-                <a:spcPct val="170000"/>
-              </a:lnSpc>
-            </a:pPr>
-            <a:r>
-              <a:rPr lang="en-US" dirty="0"/>
-              <a:t>The presence of mixed positive and mixed negative sentiments suggests that there are opportunities to convert those mixed experiences into more clearly positive ones, potentially boosting overall ratings. Addressing the specific concerns in mixed reviews could elevate customer satisfaction.</a:t>
-            </a:r>
-            <a:endParaRPr lang="nb-NO" dirty="0"/>
-          </a:p>
-        </p:txBody>
-      </p:sp>
       <p:pic>
         <p:nvPicPr>
-          <p:cNvPr id="5" name="Image 4"/>
+          <p:cNvPr id="4" name="Picture 3"/>
           <p:cNvPicPr>
             <a:picLocks noChangeAspect="1"/>
           </p:cNvPicPr>
@@ -4193,24 +4474,141 @@
         </p:nvPicPr>
         <p:blipFill>
           <a:blip r:embed="rId1"/>
-          <a:srcRect r="51282"/>
+          <a:srcRect l="988" t="1604" r="50798" b="989"/>
           <a:stretch>
             <a:fillRect/>
           </a:stretch>
         </p:blipFill>
         <p:spPr>
           <a:xfrm>
-            <a:off x="6470954" y="1510463"/>
-            <a:ext cx="3278198" cy="2275321"/>
+            <a:off x="6663055" y="1363980"/>
+            <a:ext cx="3458845" cy="2530475"/>
           </a:xfrm>
           <a:prstGeom prst="rect">
             <a:avLst/>
           </a:prstGeom>
         </p:spPr>
       </p:pic>
+      <p:sp>
+        <p:nvSpPr>
+          <p:cNvPr id="2" name="Title 1"/>
+          <p:cNvSpPr>
+            <a:spLocks noGrp="1"/>
+          </p:cNvSpPr>
+          <p:nvPr>
+            <p:ph type="title"/>
+          </p:nvPr>
+        </p:nvSpPr>
+        <p:spPr/>
+        <p:txBody>
+          <a:bodyPr/>
+          <a:lstStyle/>
+          <a:p>
+            <a:r>
+              <a:rPr lang="nb-NO" dirty="0" err="1"/>
+              <a:t>Customer</a:t>
+            </a:r>
+            <a:r>
+              <a:rPr lang="nb-NO" dirty="0"/>
+              <a:t> Feedback Analysis</a:t>
+            </a:r>
+            <a:endParaRPr lang="nb-NO" dirty="0"/>
+          </a:p>
+        </p:txBody>
+      </p:sp>
+      <p:sp>
+        <p:nvSpPr>
+          <p:cNvPr id="3" name="Content Placeholder 2"/>
+          <p:cNvSpPr>
+            <a:spLocks noGrp="1"/>
+          </p:cNvSpPr>
+          <p:nvPr>
+            <p:ph sz="half" idx="1"/>
+          </p:nvPr>
+        </p:nvSpPr>
+        <p:spPr/>
+        <p:txBody>
+          <a:bodyPr>
+            <a:normAutofit fontScale="40000" lnSpcReduction="20000"/>
+          </a:bodyPr>
+          <a:lstStyle/>
+          <a:p>
+            <a:pPr>
+              <a:lnSpc>
+                <a:spcPct val="170000"/>
+              </a:lnSpc>
+            </a:pPr>
+            <a:r>
+              <a:rPr lang="en-US" b="1" dirty="0"/>
+              <a:t>Customer Ratings Distribution:</a:t>
+            </a:r>
+            <a:endParaRPr lang="en-US" b="1" dirty="0"/>
+          </a:p>
+          <a:p>
+            <a:pPr lvl="1">
+              <a:lnSpc>
+                <a:spcPct val="170000"/>
+              </a:lnSpc>
+            </a:pPr>
+            <a:r>
+              <a:rPr lang="en-US" dirty="0"/>
+              <a:t>The majority of customer reviews are in the higher ratings, with 140 reviews at 4 stars and 135 reviews at 5 stars, indicating overall positive feedback. Lower ratings (1-2 stars) account for a smaller proportion, with 26 reviews at 1 star and 57 reviews at 2 stars.</a:t>
+            </a:r>
+            <a:endParaRPr lang="en-US" dirty="0"/>
+          </a:p>
+          <a:p>
+            <a:pPr>
+              <a:lnSpc>
+                <a:spcPct val="170000"/>
+              </a:lnSpc>
+            </a:pPr>
+            <a:r>
+              <a:rPr lang="en-US" b="1" dirty="0"/>
+              <a:t>Sentiment Analysis:</a:t>
+            </a:r>
+            <a:endParaRPr lang="en-US" b="1" dirty="0"/>
+          </a:p>
+          <a:p>
+            <a:pPr lvl="1">
+              <a:lnSpc>
+                <a:spcPct val="170000"/>
+              </a:lnSpc>
+            </a:pPr>
+            <a:r>
+              <a:rPr lang="en-US" dirty="0"/>
+              <a:t>Positive sentiment dominates with 275 reviews, reflecting a generally satisfied customer base. Negative sentiment is present in 82 reviews, with a smaller number of mixed and neutral sentiments, suggesting some areas for improvement but overall strong customer approval.</a:t>
+            </a:r>
+            <a:endParaRPr lang="en-US" dirty="0"/>
+          </a:p>
+          <a:p>
+            <a:pPr>
+              <a:lnSpc>
+                <a:spcPct val="170000"/>
+              </a:lnSpc>
+            </a:pPr>
+            <a:r>
+              <a:rPr lang="en-US" b="1" dirty="0"/>
+              <a:t>Opportunity for Improvement:</a:t>
+            </a:r>
+            <a:endParaRPr lang="en-US" b="1" dirty="0"/>
+          </a:p>
+          <a:p>
+            <a:pPr lvl="1">
+              <a:lnSpc>
+                <a:spcPct val="170000"/>
+              </a:lnSpc>
+            </a:pPr>
+            <a:r>
+              <a:rPr lang="en-US" dirty="0"/>
+              <a:t>The presence of mixed positive and mixed negative sentiments suggests that there are opportunities to convert those mixed experiences into more clearly positive ones, potentially boosting overall ratings. Addressing the specific concerns in mixed reviews could elevate customer satisfaction.</a:t>
+            </a:r>
+            <a:endParaRPr lang="nb-NO" dirty="0"/>
+          </a:p>
+        </p:txBody>
+      </p:sp>
       <p:pic>
         <p:nvPicPr>
-          <p:cNvPr id="9" name="Image 8"/>
+          <p:cNvPr id="6" name="Picture 5"/>
           <p:cNvPicPr>
             <a:picLocks noChangeAspect="1"/>
           </p:cNvPicPr>
@@ -4218,15 +4616,15 @@
         </p:nvPicPr>
         <p:blipFill>
           <a:blip r:embed="rId1"/>
-          <a:srcRect l="48718"/>
+          <a:srcRect l="49891" t="1021" r="-325" b="1585"/>
           <a:stretch>
             <a:fillRect/>
           </a:stretch>
         </p:blipFill>
         <p:spPr>
           <a:xfrm>
-            <a:off x="6470953" y="3886060"/>
-            <a:ext cx="3278198" cy="2161570"/>
+            <a:off x="6663055" y="4006850"/>
+            <a:ext cx="3544570" cy="2546350"/>
           </a:xfrm>
           <a:prstGeom prst="rect">
             <a:avLst/>
@@ -4921,4 +5319,263 @@
     </a:ext>
   </a:extLst>
 </a:theme>
+</file>
+
+<file path=ppt/theme/theme2.xml><?xml version="1.0" encoding="utf-8"?>
+<a:theme xmlns:a="http://schemas.openxmlformats.org/drawingml/2006/main" name="Office Theme">
+  <a:themeElements>
+    <a:clrScheme name="Office">
+      <a:dk1>
+        <a:sysClr val="windowText" lastClr="000000"/>
+      </a:dk1>
+      <a:lt1>
+        <a:sysClr val="window" lastClr="FFFFFF"/>
+      </a:lt1>
+      <a:dk2>
+        <a:srgbClr val="44546A"/>
+      </a:dk2>
+      <a:lt2>
+        <a:srgbClr val="E7E6E6"/>
+      </a:lt2>
+      <a:accent1>
+        <a:srgbClr val="5B9BD5"/>
+      </a:accent1>
+      <a:accent2>
+        <a:srgbClr val="ED7D31"/>
+      </a:accent2>
+      <a:accent3>
+        <a:srgbClr val="A5A5A5"/>
+      </a:accent3>
+      <a:accent4>
+        <a:srgbClr val="FFC000"/>
+      </a:accent4>
+      <a:accent5>
+        <a:srgbClr val="4472C4"/>
+      </a:accent5>
+      <a:accent6>
+        <a:srgbClr val="70AD47"/>
+      </a:accent6>
+      <a:hlink>
+        <a:srgbClr val="0563C1"/>
+      </a:hlink>
+      <a:folHlink>
+        <a:srgbClr val="954F72"/>
+      </a:folHlink>
+    </a:clrScheme>
+    <a:fontScheme name="Office">
+      <a:majorFont>
+        <a:latin typeface="Calibri Light"/>
+        <a:ea typeface=""/>
+        <a:cs typeface=""/>
+        <a:font script="Jpan" typeface="ＭＳ Ｐゴシック"/>
+        <a:font script="Hang" typeface="맑은 고딕"/>
+        <a:font script="Hans" typeface="宋体"/>
+        <a:font script="Hant" typeface="新細明體"/>
+        <a:font script="Arab" typeface="Times New Roman"/>
+        <a:font script="Hebr" typeface="Times New Roman"/>
+        <a:font script="Thai" typeface="Angsana New"/>
+        <a:font script="Ethi" typeface="Nyala"/>
+        <a:font script="Beng" typeface="Vrinda"/>
+        <a:font script="Gujr" typeface="Shruti"/>
+        <a:font script="Khmr" typeface="MoolBoran"/>
+        <a:font script="Knda" typeface="Tunga"/>
+        <a:font script="Guru" typeface="Raavi"/>
+        <a:font script="Cans" typeface="Euphemia"/>
+        <a:font script="Cher" typeface="Plantagenet Cherokee"/>
+        <a:font script="Yiii" typeface="Microsoft Yi Baiti"/>
+        <a:font script="Tibt" typeface="Microsoft Himalaya"/>
+        <a:font script="Thaa" typeface="MV Boli"/>
+        <a:font script="Deva" typeface="Mangal"/>
+        <a:font script="Telu" typeface="Gautami"/>
+        <a:font script="Taml" typeface="Latha"/>
+        <a:font script="Syrc" typeface="Estrangelo Edessa"/>
+        <a:font script="Orya" typeface="Kalinga"/>
+        <a:font script="Mlym" typeface="Kartika"/>
+        <a:font script="Laoo" typeface="DokChampa"/>
+        <a:font script="Sinh" typeface="Iskoola Pota"/>
+        <a:font script="Mong" typeface="Mongolian Baiti"/>
+        <a:font script="Viet" typeface="Times New Roman"/>
+        <a:font script="Uigh" typeface="Microsoft Uighur"/>
+        <a:font script="Geor" typeface="Sylfaen"/>
+      </a:majorFont>
+      <a:minorFont>
+        <a:latin typeface="Calibri"/>
+        <a:ea typeface=""/>
+        <a:cs typeface=""/>
+        <a:font script="Jpan" typeface="ＭＳ Ｐゴシック"/>
+        <a:font script="Hang" typeface="맑은 고딕"/>
+        <a:font script="Hans" typeface="宋体"/>
+        <a:font script="Hant" typeface="新細明體"/>
+        <a:font script="Arab" typeface="Arial"/>
+        <a:font script="Hebr" typeface="Arial"/>
+        <a:font script="Thai" typeface="Cordia New"/>
+        <a:font script="Ethi" typeface="Nyala"/>
+        <a:font script="Beng" typeface="Vrinda"/>
+        <a:font script="Gujr" typeface="Shruti"/>
+        <a:font script="Khmr" typeface="DaunPenh"/>
+        <a:font script="Knda" typeface="Tunga"/>
+        <a:font script="Guru" typeface="Raavi"/>
+        <a:font script="Cans" typeface="Euphemia"/>
+        <a:font script="Cher" typeface="Plantagenet Cherokee"/>
+        <a:font script="Yiii" typeface="Microsoft Yi Baiti"/>
+        <a:font script="Tibt" typeface="Microsoft Himalaya"/>
+        <a:font script="Thaa" typeface="MV Boli"/>
+        <a:font script="Deva" typeface="Mangal"/>
+        <a:font script="Telu" typeface="Gautami"/>
+        <a:font script="Taml" typeface="Latha"/>
+        <a:font script="Syrc" typeface="Estrangelo Edessa"/>
+        <a:font script="Orya" typeface="Kalinga"/>
+        <a:font script="Mlym" typeface="Kartika"/>
+        <a:font script="Laoo" typeface="DokChampa"/>
+        <a:font script="Sinh" typeface="Iskoola Pota"/>
+        <a:font script="Mong" typeface="Mongolian Baiti"/>
+        <a:font script="Viet" typeface="Arial"/>
+        <a:font script="Uigh" typeface="Microsoft Uighur"/>
+        <a:font script="Geor" typeface="Sylfaen"/>
+      </a:minorFont>
+    </a:fontScheme>
+    <a:fmtScheme name="Office">
+      <a:fillStyleLst>
+        <a:solidFill>
+          <a:schemeClr val="phClr"/>
+        </a:solidFill>
+        <a:gradFill rotWithShape="1">
+          <a:gsLst>
+            <a:gs pos="0">
+              <a:schemeClr val="phClr">
+                <a:lumMod val="110000"/>
+                <a:satMod val="105000"/>
+                <a:tint val="67000"/>
+              </a:schemeClr>
+            </a:gs>
+            <a:gs pos="50000">
+              <a:schemeClr val="phClr">
+                <a:lumMod val="105000"/>
+                <a:satMod val="103000"/>
+                <a:tint val="73000"/>
+              </a:schemeClr>
+            </a:gs>
+            <a:gs pos="100000">
+              <a:schemeClr val="phClr">
+                <a:lumMod val="105000"/>
+                <a:satMod val="109000"/>
+                <a:tint val="81000"/>
+              </a:schemeClr>
+            </a:gs>
+          </a:gsLst>
+          <a:lin ang="5400000" scaled="0"/>
+        </a:gradFill>
+        <a:gradFill rotWithShape="1">
+          <a:gsLst>
+            <a:gs pos="0">
+              <a:schemeClr val="phClr">
+                <a:satMod val="103000"/>
+                <a:lumMod val="102000"/>
+                <a:tint val="94000"/>
+              </a:schemeClr>
+            </a:gs>
+            <a:gs pos="50000">
+              <a:schemeClr val="phClr">
+                <a:satMod val="110000"/>
+                <a:lumMod val="100000"/>
+                <a:shade val="100000"/>
+              </a:schemeClr>
+            </a:gs>
+            <a:gs pos="100000">
+              <a:schemeClr val="phClr">
+                <a:lumMod val="99000"/>
+                <a:satMod val="120000"/>
+                <a:shade val="78000"/>
+              </a:schemeClr>
+            </a:gs>
+          </a:gsLst>
+          <a:lin ang="5400000" scaled="0"/>
+        </a:gradFill>
+      </a:fillStyleLst>
+      <a:lnStyleLst>
+        <a:ln w="6350" cap="flat" cmpd="sng" algn="ctr">
+          <a:solidFill>
+            <a:schemeClr val="phClr"/>
+          </a:solidFill>
+          <a:prstDash val="solid"/>
+          <a:miter lim="800000"/>
+        </a:ln>
+        <a:ln w="12700" cap="flat" cmpd="sng" algn="ctr">
+          <a:solidFill>
+            <a:schemeClr val="phClr"/>
+          </a:solidFill>
+          <a:prstDash val="solid"/>
+          <a:miter lim="800000"/>
+        </a:ln>
+        <a:ln w="19050" cap="flat" cmpd="sng" algn="ctr">
+          <a:solidFill>
+            <a:schemeClr val="phClr"/>
+          </a:solidFill>
+          <a:prstDash val="solid"/>
+          <a:miter lim="800000"/>
+        </a:ln>
+      </a:lnStyleLst>
+      <a:effectStyleLst>
+        <a:effectStyle>
+          <a:effectLst/>
+        </a:effectStyle>
+        <a:effectStyle>
+          <a:effectLst/>
+        </a:effectStyle>
+        <a:effectStyle>
+          <a:effectLst>
+            <a:outerShdw blurRad="57150" dist="19050" dir="5400000" algn="ctr" rotWithShape="0">
+              <a:srgbClr val="000000">
+                <a:alpha val="63000"/>
+              </a:srgbClr>
+            </a:outerShdw>
+          </a:effectLst>
+        </a:effectStyle>
+      </a:effectStyleLst>
+      <a:bgFillStyleLst>
+        <a:solidFill>
+          <a:schemeClr val="phClr"/>
+        </a:solidFill>
+        <a:solidFill>
+          <a:schemeClr val="phClr">
+            <a:tint val="95000"/>
+            <a:satMod val="170000"/>
+          </a:schemeClr>
+        </a:solidFill>
+        <a:gradFill rotWithShape="1">
+          <a:gsLst>
+            <a:gs pos="0">
+              <a:schemeClr val="phClr">
+                <a:tint val="93000"/>
+                <a:satMod val="150000"/>
+                <a:shade val="98000"/>
+                <a:lumMod val="102000"/>
+              </a:schemeClr>
+            </a:gs>
+            <a:gs pos="50000">
+              <a:schemeClr val="phClr">
+                <a:tint val="98000"/>
+                <a:satMod val="130000"/>
+                <a:shade val="90000"/>
+                <a:lumMod val="103000"/>
+              </a:schemeClr>
+            </a:gs>
+            <a:gs pos="100000">
+              <a:schemeClr val="phClr">
+                <a:shade val="63000"/>
+                <a:satMod val="120000"/>
+              </a:schemeClr>
+            </a:gs>
+          </a:gsLst>
+          <a:lin ang="5400000" scaled="0"/>
+        </a:gradFill>
+      </a:bgFillStyleLst>
+    </a:fmtScheme>
+  </a:themeElements>
+  <a:extLst>
+    <a:ext uri="{05A4C25C-085E-4340-85A3-A5531E510DB2}">
+      <thm15:themeFamily xmlns:thm15="http://schemas.microsoft.com/office/thememl/2012/main" name="Office Theme" id="{62F939B6-93AF-4DB8-9C6B-D6C7DFDC589F}" vid="{4A3C46E8-61CC-4603-A589-7422A47A8E4A}"/>
+    </a:ext>
+  </a:extLst>
+</a:theme>
 </file>
</xml_diff>

<commit_message>
Updated content in Marketing Analytics Business Case.pptx
</commit_message>
<xml_diff>
--- a/Marketing Analytics Business Case.pptx
+++ b/Marketing Analytics Business Case.pptx
@@ -4089,7 +4089,15 @@
             </a:pPr>
             <a:r>
               <a:rPr lang="en-US" dirty="0"/>
-              <a:t>May experienced the lowest overall conversion rate at 4.3%, with no products standing out significantly in terms of conversion. This indicates a potential need to revisit marketing strategies or promotions during this period to boost performance.</a:t>
+              <a:t>May experienced the lowest overall conversion rate at 4.</a:t>
+            </a:r>
+            <a:r>
+              <a:rPr lang="fr-FR" altLang="en-US" dirty="0"/>
+              <a:t>5</a:t>
+            </a:r>
+            <a:r>
+              <a:rPr lang="en-US" dirty="0"/>
+              <a:t>%, with no products standing out significantly in terms of conversion. This indicates a potential need to revisit marketing strategies or promotions during this period to boost performance.</a:t>
             </a:r>
             <a:endParaRPr lang="en-US" dirty="0"/>
           </a:p>
@@ -4113,7 +4121,15 @@
             </a:pPr>
             <a:r>
               <a:rPr lang="en-US" dirty="0"/>
-              <a:t>January recorded the highest overall conversion rate at 18.5%, driven significantly by the Ski Boots with a remarkable 150% conversion. This indicates a strong start to the year, likely fueled by seasonal demand and effective marketing strategies.</a:t>
+              <a:t>January recorded the highest overall conversion rate at 1</a:t>
+            </a:r>
+            <a:r>
+              <a:rPr lang="fr-FR" altLang="en-US" dirty="0"/>
+              <a:t>9.6</a:t>
+            </a:r>
+            <a:r>
+              <a:rPr lang="en-US" dirty="0"/>
+              <a:t>%, driven significantly by the Ski Boots with a remarkable 150% conversion. This indicates a strong start to the year, likely fueled by seasonal demand and effective marketing strategies.</a:t>
             </a:r>
             <a:endParaRPr lang="en-US" dirty="0"/>
           </a:p>
@@ -4394,7 +4410,15 @@
             </a:pPr>
             <a:r>
               <a:rPr lang="en-US" dirty="0"/>
-              <a:t>Blog content drove the most views, especially in April and July, while social media and video content maintained steady but slightly lower engagement.</a:t>
+              <a:t>Blog content drove the most views, especially in </a:t>
+            </a:r>
+            <a:r>
+              <a:rPr lang="en-US" altLang="en-US"/>
+              <a:t>March and May</a:t>
+            </a:r>
+            <a:r>
+              <a:rPr lang="en-US" dirty="0"/>
+              <a:t>, while social media and video content maintained steady but slightly lower engagement.</a:t>
             </a:r>
             <a:endParaRPr lang="nb-NO" dirty="0"/>
           </a:p>

</xml_diff>